<commit_message>
I have the transitions and animations figured out
</commit_message>
<xml_diff>
--- a/Animaton.pptx
+++ b/Animaton.pptx
@@ -5,13 +5,12 @@
     <p:sldMasterId id="2147483648" r:id="rId1"/>
   </p:sldMasterIdLst>
   <p:sldIdLst>
-    <p:sldId id="263" r:id="rId2"/>
-    <p:sldId id="257" r:id="rId3"/>
-    <p:sldId id="258" r:id="rId4"/>
-    <p:sldId id="259" r:id="rId5"/>
-    <p:sldId id="260" r:id="rId6"/>
-    <p:sldId id="261" r:id="rId7"/>
-    <p:sldId id="262" r:id="rId8"/>
+    <p:sldId id="257" r:id="rId2"/>
+    <p:sldId id="258" r:id="rId3"/>
+    <p:sldId id="259" r:id="rId4"/>
+    <p:sldId id="260" r:id="rId5"/>
+    <p:sldId id="261" r:id="rId6"/>
+    <p:sldId id="262" r:id="rId7"/>
   </p:sldIdLst>
   <p:sldSz cx="12192000" cy="6858000"/>
   <p:notesSz cx="6858000" cy="9144000"/>
@@ -6203,6 +6202,18 @@
   <p:clrMapOvr>
     <a:masterClrMapping/>
   </p:clrMapOvr>
+  <mc:AlternateContent xmlns:mc="http://schemas.openxmlformats.org/markup-compatibility/2006">
+    <mc:Choice xmlns:p14="http://schemas.microsoft.com/office/powerpoint/2010/main" Requires="p14">
+      <p:transition spd="med" p14:dur="700">
+        <p:fade/>
+      </p:transition>
+    </mc:Choice>
+    <mc:Fallback>
+      <p:transition spd="med">
+        <p:fade/>
+      </p:transition>
+    </mc:Fallback>
+  </mc:AlternateContent>
 </p:sldLayout>
 </file>
 
@@ -6401,6 +6412,18 @@
   <p:clrMapOvr>
     <a:masterClrMapping/>
   </p:clrMapOvr>
+  <mc:AlternateContent xmlns:mc="http://schemas.openxmlformats.org/markup-compatibility/2006">
+    <mc:Choice xmlns:p14="http://schemas.microsoft.com/office/powerpoint/2010/main" Requires="p14">
+      <p:transition spd="med" p14:dur="700">
+        <p:fade/>
+      </p:transition>
+    </mc:Choice>
+    <mc:Fallback>
+      <p:transition spd="med">
+        <p:fade/>
+      </p:transition>
+    </mc:Fallback>
+  </mc:AlternateContent>
 </p:sldLayout>
 </file>
 
@@ -6609,6 +6632,18 @@
   <p:clrMapOvr>
     <a:masterClrMapping/>
   </p:clrMapOvr>
+  <mc:AlternateContent xmlns:mc="http://schemas.openxmlformats.org/markup-compatibility/2006">
+    <mc:Choice xmlns:p14="http://schemas.microsoft.com/office/powerpoint/2010/main" Requires="p14">
+      <p:transition spd="med" p14:dur="700">
+        <p:fade/>
+      </p:transition>
+    </mc:Choice>
+    <mc:Fallback>
+      <p:transition spd="med">
+        <p:fade/>
+      </p:transition>
+    </mc:Fallback>
+  </mc:AlternateContent>
 </p:sldLayout>
 </file>
 
@@ -6807,6 +6842,18 @@
   <p:clrMapOvr>
     <a:masterClrMapping/>
   </p:clrMapOvr>
+  <mc:AlternateContent xmlns:mc="http://schemas.openxmlformats.org/markup-compatibility/2006">
+    <mc:Choice xmlns:p14="http://schemas.microsoft.com/office/powerpoint/2010/main" Requires="p14">
+      <p:transition spd="med" p14:dur="700">
+        <p:fade/>
+      </p:transition>
+    </mc:Choice>
+    <mc:Fallback>
+      <p:transition spd="med">
+        <p:fade/>
+      </p:transition>
+    </mc:Fallback>
+  </mc:AlternateContent>
 </p:sldLayout>
 </file>
 
@@ -7082,6 +7129,18 @@
   <p:clrMapOvr>
     <a:masterClrMapping/>
   </p:clrMapOvr>
+  <mc:AlternateContent xmlns:mc="http://schemas.openxmlformats.org/markup-compatibility/2006">
+    <mc:Choice xmlns:p14="http://schemas.microsoft.com/office/powerpoint/2010/main" Requires="p14">
+      <p:transition spd="med" p14:dur="700">
+        <p:fade/>
+      </p:transition>
+    </mc:Choice>
+    <mc:Fallback>
+      <p:transition spd="med">
+        <p:fade/>
+      </p:transition>
+    </mc:Fallback>
+  </mc:AlternateContent>
 </p:sldLayout>
 </file>
 
@@ -7347,6 +7406,18 @@
   <p:clrMapOvr>
     <a:masterClrMapping/>
   </p:clrMapOvr>
+  <mc:AlternateContent xmlns:mc="http://schemas.openxmlformats.org/markup-compatibility/2006">
+    <mc:Choice xmlns:p14="http://schemas.microsoft.com/office/powerpoint/2010/main" Requires="p14">
+      <p:transition spd="med" p14:dur="700">
+        <p:fade/>
+      </p:transition>
+    </mc:Choice>
+    <mc:Fallback>
+      <p:transition spd="med">
+        <p:fade/>
+      </p:transition>
+    </mc:Fallback>
+  </mc:AlternateContent>
 </p:sldLayout>
 </file>
 
@@ -7759,6 +7830,18 @@
   <p:clrMapOvr>
     <a:masterClrMapping/>
   </p:clrMapOvr>
+  <mc:AlternateContent xmlns:mc="http://schemas.openxmlformats.org/markup-compatibility/2006">
+    <mc:Choice xmlns:p14="http://schemas.microsoft.com/office/powerpoint/2010/main" Requires="p14">
+      <p:transition spd="med" p14:dur="700">
+        <p:fade/>
+      </p:transition>
+    </mc:Choice>
+    <mc:Fallback>
+      <p:transition spd="med">
+        <p:fade/>
+      </p:transition>
+    </mc:Fallback>
+  </mc:AlternateContent>
 </p:sldLayout>
 </file>
 
@@ -7900,6 +7983,18 @@
   <p:clrMapOvr>
     <a:masterClrMapping/>
   </p:clrMapOvr>
+  <mc:AlternateContent xmlns:mc="http://schemas.openxmlformats.org/markup-compatibility/2006">
+    <mc:Choice xmlns:p14="http://schemas.microsoft.com/office/powerpoint/2010/main" Requires="p14">
+      <p:transition spd="med" p14:dur="700">
+        <p:fade/>
+      </p:transition>
+    </mc:Choice>
+    <mc:Fallback>
+      <p:transition spd="med">
+        <p:fade/>
+      </p:transition>
+    </mc:Fallback>
+  </mc:AlternateContent>
 </p:sldLayout>
 </file>
 
@@ -8013,6 +8108,18 @@
   <p:clrMapOvr>
     <a:masterClrMapping/>
   </p:clrMapOvr>
+  <mc:AlternateContent xmlns:mc="http://schemas.openxmlformats.org/markup-compatibility/2006">
+    <mc:Choice xmlns:p14="http://schemas.microsoft.com/office/powerpoint/2010/main" Requires="p14">
+      <p:transition spd="med" p14:dur="700">
+        <p:fade/>
+      </p:transition>
+    </mc:Choice>
+    <mc:Fallback>
+      <p:transition spd="med">
+        <p:fade/>
+      </p:transition>
+    </mc:Fallback>
+  </mc:AlternateContent>
 </p:sldLayout>
 </file>
 
@@ -8324,6 +8431,18 @@
   <p:clrMapOvr>
     <a:masterClrMapping/>
   </p:clrMapOvr>
+  <mc:AlternateContent xmlns:mc="http://schemas.openxmlformats.org/markup-compatibility/2006">
+    <mc:Choice xmlns:p14="http://schemas.microsoft.com/office/powerpoint/2010/main" Requires="p14">
+      <p:transition spd="med" p14:dur="700">
+        <p:fade/>
+      </p:transition>
+    </mc:Choice>
+    <mc:Fallback>
+      <p:transition spd="med">
+        <p:fade/>
+      </p:transition>
+    </mc:Fallback>
+  </mc:AlternateContent>
 </p:sldLayout>
 </file>
 
@@ -8612,6 +8731,18 @@
   <p:clrMapOvr>
     <a:masterClrMapping/>
   </p:clrMapOvr>
+  <mc:AlternateContent xmlns:mc="http://schemas.openxmlformats.org/markup-compatibility/2006">
+    <mc:Choice xmlns:p14="http://schemas.microsoft.com/office/powerpoint/2010/main" Requires="p14">
+      <p:transition spd="med" p14:dur="700">
+        <p:fade/>
+      </p:transition>
+    </mc:Choice>
+    <mc:Fallback>
+      <p:transition spd="med">
+        <p:fade/>
+      </p:transition>
+    </mc:Fallback>
+  </mc:AlternateContent>
 </p:sldLayout>
 </file>
 
@@ -8900,6 +9031,18 @@
     <p:sldLayoutId id="2147483658" r:id="rId10"/>
     <p:sldLayoutId id="2147483659" r:id="rId11"/>
   </p:sldLayoutIdLst>
+  <mc:AlternateContent xmlns:mc="http://schemas.openxmlformats.org/markup-compatibility/2006">
+    <mc:Choice xmlns:p14="http://schemas.microsoft.com/office/powerpoint/2010/main" Requires="p14">
+      <p:transition spd="med" p14:dur="700">
+        <p:fade/>
+      </p:transition>
+    </mc:Choice>
+    <mc:Fallback>
+      <p:transition spd="med">
+        <p:fade/>
+      </p:transition>
+    </mc:Fallback>
+  </mc:AlternateContent>
   <p:txStyles>
     <p:titleStyle>
       <a:lvl1pPr algn="l" defTabSz="914400" rtl="0" eaLnBrk="1" latinLnBrk="0" hangingPunct="1">
@@ -9200,111 +9343,6 @@
           <a:chExt cx="0" cy="0"/>
         </a:xfrm>
       </p:grpSpPr>
-      <p:sp>
-        <p:nvSpPr>
-          <p:cNvPr id="2" name="Title 1">
-            <a:extLst>
-              <a:ext uri="{FF2B5EF4-FFF2-40B4-BE49-F238E27FC236}">
-                <a16:creationId xmlns:a16="http://schemas.microsoft.com/office/drawing/2014/main" id="{E0C4FCF9-08D0-28B2-87E9-24976ABD1A7A}"/>
-              </a:ext>
-            </a:extLst>
-          </p:cNvPr>
-          <p:cNvSpPr>
-            <a:spLocks noGrp="1"/>
-          </p:cNvSpPr>
-          <p:nvPr>
-            <p:ph type="title"/>
-          </p:nvPr>
-        </p:nvSpPr>
-        <p:spPr/>
-        <p:txBody>
-          <a:bodyPr/>
-          <a:lstStyle/>
-          <a:p>
-            <a:endParaRPr lang="en-US"/>
-          </a:p>
-        </p:txBody>
-      </p:sp>
-      <p:sp>
-        <p:nvSpPr>
-          <p:cNvPr id="3" name="Content Placeholder 2">
-            <a:extLst>
-              <a:ext uri="{FF2B5EF4-FFF2-40B4-BE49-F238E27FC236}">
-                <a16:creationId xmlns:a16="http://schemas.microsoft.com/office/drawing/2014/main" id="{5AE758E2-4E39-940D-32F2-D72D8FE913CB}"/>
-              </a:ext>
-            </a:extLst>
-          </p:cNvPr>
-          <p:cNvSpPr>
-            <a:spLocks noGrp="1"/>
-          </p:cNvSpPr>
-          <p:nvPr>
-            <p:ph sz="half" idx="1"/>
-          </p:nvPr>
-        </p:nvSpPr>
-        <p:spPr/>
-        <p:txBody>
-          <a:bodyPr/>
-          <a:lstStyle/>
-          <a:p>
-            <a:endParaRPr lang="en-US"/>
-          </a:p>
-        </p:txBody>
-      </p:sp>
-      <p:sp>
-        <p:nvSpPr>
-          <p:cNvPr id="4" name="Content Placeholder 3">
-            <a:extLst>
-              <a:ext uri="{FF2B5EF4-FFF2-40B4-BE49-F238E27FC236}">
-                <a16:creationId xmlns:a16="http://schemas.microsoft.com/office/drawing/2014/main" id="{73CCBB01-7804-6624-50DC-EC20E2428CFE}"/>
-              </a:ext>
-            </a:extLst>
-          </p:cNvPr>
-          <p:cNvSpPr>
-            <a:spLocks noGrp="1"/>
-          </p:cNvSpPr>
-          <p:nvPr>
-            <p:ph sz="half" idx="2"/>
-          </p:nvPr>
-        </p:nvSpPr>
-        <p:spPr/>
-        <p:txBody>
-          <a:bodyPr/>
-          <a:lstStyle/>
-          <a:p>
-            <a:endParaRPr lang="en-US"/>
-          </a:p>
-        </p:txBody>
-      </p:sp>
-    </p:spTree>
-    <p:extLst>
-      <p:ext uri="{BB962C8B-B14F-4D97-AF65-F5344CB8AC3E}">
-        <p14:creationId xmlns:p14="http://schemas.microsoft.com/office/powerpoint/2010/main" val="2077727946"/>
-      </p:ext>
-    </p:extLst>
-  </p:cSld>
-  <p:clrMapOvr>
-    <a:masterClrMapping/>
-  </p:clrMapOvr>
-</p:sld>
-</file>
-
-<file path=ppt/slides/slide2.xml><?xml version="1.0" encoding="utf-8"?>
-<p:sld xmlns:a="http://schemas.openxmlformats.org/drawingml/2006/main" xmlns:r="http://schemas.openxmlformats.org/officeDocument/2006/relationships" xmlns:p="http://schemas.openxmlformats.org/presentationml/2006/main">
-  <p:cSld>
-    <p:spTree>
-      <p:nvGrpSpPr>
-        <p:cNvPr id="1" name=""/>
-        <p:cNvGrpSpPr/>
-        <p:nvPr/>
-      </p:nvGrpSpPr>
-      <p:grpSpPr>
-        <a:xfrm>
-          <a:off x="0" y="0"/>
-          <a:ext cx="0" cy="0"/>
-          <a:chOff x="0" y="0"/>
-          <a:chExt cx="0" cy="0"/>
-        </a:xfrm>
-      </p:grpSpPr>
       <p:graphicFrame>
         <p:nvGraphicFramePr>
           <p:cNvPr id="6" name="Chart 5">
@@ -9345,10 +9383,18 @@
   <p:clrMapOvr>
     <a:masterClrMapping/>
   </p:clrMapOvr>
+  <mc:AlternateContent xmlns:mc="http://schemas.openxmlformats.org/markup-compatibility/2006">
+    <mc:Choice xmlns:p14="http://schemas.microsoft.com/office/powerpoint/2010/main" Requires="p14">
+      <p:transition p14:dur="0"/>
+    </mc:Choice>
+    <mc:Fallback>
+      <p:transition/>
+    </mc:Fallback>
+  </mc:AlternateContent>
 </p:sld>
 </file>
 
-<file path=ppt/slides/slide3.xml><?xml version="1.0" encoding="utf-8"?>
+<file path=ppt/slides/slide2.xml><?xml version="1.0" encoding="utf-8"?>
 <p:sld xmlns:a="http://schemas.openxmlformats.org/drawingml/2006/main" xmlns:r="http://schemas.openxmlformats.org/officeDocument/2006/relationships" xmlns:p="http://schemas.openxmlformats.org/presentationml/2006/main">
   <p:cSld>
     <p:spTree>
@@ -9405,10 +9451,18 @@
   <p:clrMapOvr>
     <a:masterClrMapping/>
   </p:clrMapOvr>
+  <mc:AlternateContent xmlns:mc="http://schemas.openxmlformats.org/markup-compatibility/2006">
+    <mc:Choice xmlns:p14="http://schemas.microsoft.com/office/powerpoint/2010/main" Requires="p14">
+      <p:transition p14:dur="0"/>
+    </mc:Choice>
+    <mc:Fallback>
+      <p:transition/>
+    </mc:Fallback>
+  </mc:AlternateContent>
 </p:sld>
 </file>
 
-<file path=ppt/slides/slide4.xml><?xml version="1.0" encoding="utf-8"?>
+<file path=ppt/slides/slide3.xml><?xml version="1.0" encoding="utf-8"?>
 <p:sld xmlns:a="http://schemas.openxmlformats.org/drawingml/2006/main" xmlns:r="http://schemas.openxmlformats.org/officeDocument/2006/relationships" xmlns:p="http://schemas.openxmlformats.org/presentationml/2006/main">
   <p:cSld>
     <p:spTree>
@@ -9465,10 +9519,18 @@
   <p:clrMapOvr>
     <a:masterClrMapping/>
   </p:clrMapOvr>
+  <mc:AlternateContent xmlns:mc="http://schemas.openxmlformats.org/markup-compatibility/2006">
+    <mc:Choice xmlns:p14="http://schemas.microsoft.com/office/powerpoint/2010/main" Requires="p14">
+      <p:transition p14:dur="0"/>
+    </mc:Choice>
+    <mc:Fallback>
+      <p:transition/>
+    </mc:Fallback>
+  </mc:AlternateContent>
 </p:sld>
 </file>
 
-<file path=ppt/slides/slide5.xml><?xml version="1.0" encoding="utf-8"?>
+<file path=ppt/slides/slide4.xml><?xml version="1.0" encoding="utf-8"?>
 <p:sld xmlns:a="http://schemas.openxmlformats.org/drawingml/2006/main" xmlns:r="http://schemas.openxmlformats.org/officeDocument/2006/relationships" xmlns:p="http://schemas.openxmlformats.org/presentationml/2006/main">
   <p:cSld>
     <p:spTree>
@@ -9525,10 +9587,18 @@
   <p:clrMapOvr>
     <a:masterClrMapping/>
   </p:clrMapOvr>
+  <mc:AlternateContent xmlns:mc="http://schemas.openxmlformats.org/markup-compatibility/2006">
+    <mc:Choice xmlns:p14="http://schemas.microsoft.com/office/powerpoint/2010/main" Requires="p14">
+      <p:transition p14:dur="0"/>
+    </mc:Choice>
+    <mc:Fallback>
+      <p:transition/>
+    </mc:Fallback>
+  </mc:AlternateContent>
 </p:sld>
 </file>
 
-<file path=ppt/slides/slide6.xml><?xml version="1.0" encoding="utf-8"?>
+<file path=ppt/slides/slide5.xml><?xml version="1.0" encoding="utf-8"?>
 <p:sld xmlns:a="http://schemas.openxmlformats.org/drawingml/2006/main" xmlns:r="http://schemas.openxmlformats.org/officeDocument/2006/relationships" xmlns:p="http://schemas.openxmlformats.org/presentationml/2006/main">
   <p:cSld>
     <p:spTree>
@@ -9585,10 +9655,18 @@
   <p:clrMapOvr>
     <a:masterClrMapping/>
   </p:clrMapOvr>
+  <mc:AlternateContent xmlns:mc="http://schemas.openxmlformats.org/markup-compatibility/2006">
+    <mc:Choice xmlns:p14="http://schemas.microsoft.com/office/powerpoint/2010/main" Requires="p14">
+      <p:transition p14:dur="0"/>
+    </mc:Choice>
+    <mc:Fallback>
+      <p:transition/>
+    </mc:Fallback>
+  </mc:AlternateContent>
 </p:sld>
 </file>
 
-<file path=ppt/slides/slide7.xml><?xml version="1.0" encoding="utf-8"?>
+<file path=ppt/slides/slide6.xml><?xml version="1.0" encoding="utf-8"?>
 <p:sld xmlns:a="http://schemas.openxmlformats.org/drawingml/2006/main" xmlns:r="http://schemas.openxmlformats.org/officeDocument/2006/relationships" xmlns:p="http://schemas.openxmlformats.org/presentationml/2006/main">
   <p:cSld>
     <p:spTree>
@@ -9645,6 +9723,14 @@
   <p:clrMapOvr>
     <a:masterClrMapping/>
   </p:clrMapOvr>
+  <mc:AlternateContent xmlns:mc="http://schemas.openxmlformats.org/markup-compatibility/2006">
+    <mc:Choice xmlns:p14="http://schemas.microsoft.com/office/powerpoint/2010/main" Requires="p14">
+      <p:transition p14:dur="0"/>
+    </mc:Choice>
+    <mc:Fallback>
+      <p:transition/>
+    </mc:Fallback>
+  </mc:AlternateContent>
 </p:sld>
 </file>
 

</xml_diff>